<commit_message>
Presentation - Draft 2
</commit_message>
<xml_diff>
--- a/Group Presentation.pptx
+++ b/Group Presentation.pptx
@@ -7306,28 +7306,6 @@
               </a:rPr>
               <a:t>US Metropolitan population – API</a:t>
             </a:r>
-          </a:p>
-          <a:p>
-            <a:pPr marL="800100" lvl="1" indent="-342900">
-              <a:lnSpc>
-                <a:spcPct val="100000"/>
-              </a:lnSpc>
-              <a:buFont typeface="Wingdings" panose="05000000000000000000" pitchFamily="2" charset="2"/>
-              <a:buChar char="Ø"/>
-            </a:pPr>
-            <a:r>
-              <a:rPr lang="en-US" sz="2200" dirty="0">
-                <a:solidFill>
-                  <a:schemeClr val="tx1"/>
-                </a:solidFill>
-              </a:rPr>
-              <a:t>Canada Metropolitan population – API</a:t>
-            </a:r>
-            <a:endParaRPr lang="en-US" sz="2800" dirty="0">
-              <a:solidFill>
-                <a:schemeClr val="tx1"/>
-              </a:solidFill>
-            </a:endParaRPr>
           </a:p>
           <a:p>
             <a:pPr marL="342900" indent="-342900">
@@ -8215,15 +8193,33 @@
                                   </p:childTnLst>
                                 </p:cTn>
                               </p:par>
+                            </p:childTnLst>
+                          </p:cTn>
+                        </p:par>
+                      </p:childTnLst>
+                    </p:cTn>
+                  </p:par>
+                  <p:par>
+                    <p:cTn id="36" fill="hold">
+                      <p:stCondLst>
+                        <p:cond delay="indefinite"/>
+                      </p:stCondLst>
+                      <p:childTnLst>
+                        <p:par>
+                          <p:cTn id="37" fill="hold">
+                            <p:stCondLst>
+                              <p:cond delay="0"/>
+                            </p:stCondLst>
+                            <p:childTnLst>
                               <p:par>
-                                <p:cTn id="36" presetID="10" presetClass="entr" presetSubtype="0" fill="hold" nodeType="withEffect">
+                                <p:cTn id="38" presetID="10" presetClass="entr" presetSubtype="0" fill="hold" nodeType="clickEffect">
                                   <p:stCondLst>
                                     <p:cond delay="0"/>
                                   </p:stCondLst>
                                   <p:childTnLst>
                                     <p:set>
                                       <p:cBhvr>
-                                        <p:cTn id="37" dur="1" fill="hold">
+                                        <p:cTn id="39" dur="1" fill="hold">
                                           <p:stCondLst>
                                             <p:cond delay="0"/>
                                           </p:stCondLst>
@@ -8231,7 +8227,7 @@
                                         <p:tgtEl>
                                           <p:spTgt spid="3">
                                             <p:txEl>
-                                              <p:pRg st="9" end="9"/>
+                                              <p:pRg st="10" end="10"/>
                                             </p:txEl>
                                           </p:spTgt>
                                         </p:tgtEl>
@@ -8245,11 +8241,11 @@
                                     </p:set>
                                     <p:animEffect transition="in" filter="fade">
                                       <p:cBhvr>
-                                        <p:cTn id="38" dur="500"/>
+                                        <p:cTn id="40" dur="500"/>
                                         <p:tgtEl>
                                           <p:spTgt spid="3">
                                             <p:txEl>
-                                              <p:pRg st="9" end="9"/>
+                                              <p:pRg st="10" end="10"/>
                                             </p:txEl>
                                           </p:spTgt>
                                         </p:tgtEl>
@@ -8258,26 +8254,8 @@
                                   </p:childTnLst>
                                 </p:cTn>
                               </p:par>
-                            </p:childTnLst>
-                          </p:cTn>
-                        </p:par>
-                      </p:childTnLst>
-                    </p:cTn>
-                  </p:par>
-                  <p:par>
-                    <p:cTn id="39" fill="hold">
-                      <p:stCondLst>
-                        <p:cond delay="indefinite"/>
-                      </p:stCondLst>
-                      <p:childTnLst>
-                        <p:par>
-                          <p:cTn id="40" fill="hold">
-                            <p:stCondLst>
-                              <p:cond delay="0"/>
-                            </p:stCondLst>
-                            <p:childTnLst>
                               <p:par>
-                                <p:cTn id="41" presetID="10" presetClass="entr" presetSubtype="0" fill="hold" nodeType="clickEffect">
+                                <p:cTn id="41" presetID="10" presetClass="entr" presetSubtype="0" fill="hold" nodeType="withEffect">
                                   <p:stCondLst>
                                     <p:cond delay="0"/>
                                   </p:stCondLst>
@@ -8319,15 +8297,33 @@
                                   </p:childTnLst>
                                 </p:cTn>
                               </p:par>
+                            </p:childTnLst>
+                          </p:cTn>
+                        </p:par>
+                      </p:childTnLst>
+                    </p:cTn>
+                  </p:par>
+                  <p:par>
+                    <p:cTn id="44" fill="hold">
+                      <p:stCondLst>
+                        <p:cond delay="indefinite"/>
+                      </p:stCondLst>
+                      <p:childTnLst>
+                        <p:par>
+                          <p:cTn id="45" fill="hold">
+                            <p:stCondLst>
+                              <p:cond delay="0"/>
+                            </p:stCondLst>
+                            <p:childTnLst>
                               <p:par>
-                                <p:cTn id="44" presetID="10" presetClass="entr" presetSubtype="0" fill="hold" nodeType="withEffect">
+                                <p:cTn id="46" presetID="10" presetClass="entr" presetSubtype="0" fill="hold" nodeType="clickEffect">
                                   <p:stCondLst>
                                     <p:cond delay="0"/>
                                   </p:stCondLst>
                                   <p:childTnLst>
                                     <p:set>
                                       <p:cBhvr>
-                                        <p:cTn id="45" dur="1" fill="hold">
+                                        <p:cTn id="47" dur="1" fill="hold">
                                           <p:stCondLst>
                                             <p:cond delay="0"/>
                                           </p:stCondLst>
@@ -8349,7 +8345,7 @@
                                     </p:set>
                                     <p:animEffect transition="in" filter="fade">
                                       <p:cBhvr>
-                                        <p:cTn id="46" dur="500"/>
+                                        <p:cTn id="48" dur="500"/>
                                         <p:tgtEl>
                                           <p:spTgt spid="3">
                                             <p:txEl>
@@ -8362,26 +8358,8 @@
                                   </p:childTnLst>
                                 </p:cTn>
                               </p:par>
-                            </p:childTnLst>
-                          </p:cTn>
-                        </p:par>
-                      </p:childTnLst>
-                    </p:cTn>
-                  </p:par>
-                  <p:par>
-                    <p:cTn id="47" fill="hold">
-                      <p:stCondLst>
-                        <p:cond delay="indefinite"/>
-                      </p:stCondLst>
-                      <p:childTnLst>
-                        <p:par>
-                          <p:cTn id="48" fill="hold">
-                            <p:stCondLst>
-                              <p:cond delay="0"/>
-                            </p:stCondLst>
-                            <p:childTnLst>
                               <p:par>
-                                <p:cTn id="49" presetID="10" presetClass="entr" presetSubtype="0" fill="hold" nodeType="clickEffect">
+                                <p:cTn id="49" presetID="10" presetClass="entr" presetSubtype="0" fill="hold" nodeType="withEffect">
                                   <p:stCondLst>
                                     <p:cond delay="0"/>
                                   </p:stCondLst>
@@ -8466,15 +8444,33 @@
                                   </p:childTnLst>
                                 </p:cTn>
                               </p:par>
+                            </p:childTnLst>
+                          </p:cTn>
+                        </p:par>
+                      </p:childTnLst>
+                    </p:cTn>
+                  </p:par>
+                  <p:par>
+                    <p:cTn id="55" fill="hold">
+                      <p:stCondLst>
+                        <p:cond delay="indefinite"/>
+                      </p:stCondLst>
+                      <p:childTnLst>
+                        <p:par>
+                          <p:cTn id="56" fill="hold">
+                            <p:stCondLst>
+                              <p:cond delay="0"/>
+                            </p:stCondLst>
+                            <p:childTnLst>
                               <p:par>
-                                <p:cTn id="55" presetID="10" presetClass="entr" presetSubtype="0" fill="hold" nodeType="withEffect">
+                                <p:cTn id="57" presetID="10" presetClass="entr" presetSubtype="0" fill="hold" nodeType="clickEffect">
                                   <p:stCondLst>
                                     <p:cond delay="0"/>
                                   </p:stCondLst>
                                   <p:childTnLst>
                                     <p:set>
                                       <p:cBhvr>
-                                        <p:cTn id="56" dur="1" fill="hold">
+                                        <p:cTn id="58" dur="1" fill="hold">
                                           <p:stCondLst>
                                             <p:cond delay="0"/>
                                           </p:stCondLst>
@@ -8496,7 +8492,7 @@
                                     </p:set>
                                     <p:animEffect transition="in" filter="fade">
                                       <p:cBhvr>
-                                        <p:cTn id="57" dur="500"/>
+                                        <p:cTn id="59" dur="500"/>
                                         <p:tgtEl>
                                           <p:spTgt spid="3">
                                             <p:txEl>
@@ -8509,26 +8505,8 @@
                                   </p:childTnLst>
                                 </p:cTn>
                               </p:par>
-                            </p:childTnLst>
-                          </p:cTn>
-                        </p:par>
-                      </p:childTnLst>
-                    </p:cTn>
-                  </p:par>
-                  <p:par>
-                    <p:cTn id="58" fill="hold">
-                      <p:stCondLst>
-                        <p:cond delay="indefinite"/>
-                      </p:stCondLst>
-                      <p:childTnLst>
-                        <p:par>
-                          <p:cTn id="59" fill="hold">
-                            <p:stCondLst>
-                              <p:cond delay="0"/>
-                            </p:stCondLst>
-                            <p:childTnLst>
                               <p:par>
-                                <p:cTn id="60" presetID="10" presetClass="entr" presetSubtype="0" fill="hold" nodeType="clickEffect">
+                                <p:cTn id="60" presetID="10" presetClass="entr" presetSubtype="0" fill="hold" nodeType="withEffect">
                                   <p:stCondLst>
                                     <p:cond delay="0"/>
                                   </p:stCondLst>
@@ -8570,15 +8548,33 @@
                                   </p:childTnLst>
                                 </p:cTn>
                               </p:par>
+                            </p:childTnLst>
+                          </p:cTn>
+                        </p:par>
+                      </p:childTnLst>
+                    </p:cTn>
+                  </p:par>
+                  <p:par>
+                    <p:cTn id="63" fill="hold">
+                      <p:stCondLst>
+                        <p:cond delay="indefinite"/>
+                      </p:stCondLst>
+                      <p:childTnLst>
+                        <p:par>
+                          <p:cTn id="64" fill="hold">
+                            <p:stCondLst>
+                              <p:cond delay="0"/>
+                            </p:stCondLst>
+                            <p:childTnLst>
                               <p:par>
-                                <p:cTn id="63" presetID="10" presetClass="entr" presetSubtype="0" fill="hold" nodeType="withEffect">
+                                <p:cTn id="65" presetID="10" presetClass="entr" presetSubtype="0" fill="hold" nodeType="clickEffect">
                                   <p:stCondLst>
                                     <p:cond delay="0"/>
                                   </p:stCondLst>
                                   <p:childTnLst>
                                     <p:set>
                                       <p:cBhvr>
-                                        <p:cTn id="64" dur="1" fill="hold">
+                                        <p:cTn id="66" dur="1" fill="hold">
                                           <p:stCondLst>
                                             <p:cond delay="0"/>
                                           </p:stCondLst>
@@ -8600,72 +8596,11 @@
                                     </p:set>
                                     <p:animEffect transition="in" filter="fade">
                                       <p:cBhvr>
-                                        <p:cTn id="65" dur="500"/>
+                                        <p:cTn id="67" dur="500"/>
                                         <p:tgtEl>
                                           <p:spTgt spid="3">
                                             <p:txEl>
                                               <p:pRg st="17" end="17"/>
-                                            </p:txEl>
-                                          </p:spTgt>
-                                        </p:tgtEl>
-                                      </p:cBhvr>
-                                    </p:animEffect>
-                                  </p:childTnLst>
-                                </p:cTn>
-                              </p:par>
-                            </p:childTnLst>
-                          </p:cTn>
-                        </p:par>
-                      </p:childTnLst>
-                    </p:cTn>
-                  </p:par>
-                  <p:par>
-                    <p:cTn id="66" fill="hold">
-                      <p:stCondLst>
-                        <p:cond delay="indefinite"/>
-                      </p:stCondLst>
-                      <p:childTnLst>
-                        <p:par>
-                          <p:cTn id="67" fill="hold">
-                            <p:stCondLst>
-                              <p:cond delay="0"/>
-                            </p:stCondLst>
-                            <p:childTnLst>
-                              <p:par>
-                                <p:cTn id="68" presetID="10" presetClass="entr" presetSubtype="0" fill="hold" nodeType="clickEffect">
-                                  <p:stCondLst>
-                                    <p:cond delay="0"/>
-                                  </p:stCondLst>
-                                  <p:childTnLst>
-                                    <p:set>
-                                      <p:cBhvr>
-                                        <p:cTn id="69" dur="1" fill="hold">
-                                          <p:stCondLst>
-                                            <p:cond delay="0"/>
-                                          </p:stCondLst>
-                                        </p:cTn>
-                                        <p:tgtEl>
-                                          <p:spTgt spid="3">
-                                            <p:txEl>
-                                              <p:pRg st="18" end="18"/>
-                                            </p:txEl>
-                                          </p:spTgt>
-                                        </p:tgtEl>
-                                        <p:attrNameLst>
-                                          <p:attrName>style.visibility</p:attrName>
-                                        </p:attrNameLst>
-                                      </p:cBhvr>
-                                      <p:to>
-                                        <p:strVal val="visible"/>
-                                      </p:to>
-                                    </p:set>
-                                    <p:animEffect transition="in" filter="fade">
-                                      <p:cBhvr>
-                                        <p:cTn id="70" dur="500"/>
-                                        <p:tgtEl>
-                                          <p:spTgt spid="3">
-                                            <p:txEl>
-                                              <p:pRg st="18" end="18"/>
                                             </p:txEl>
                                           </p:spTgt>
                                         </p:tgtEl>
@@ -9936,7 +9871,7 @@
         </p:nvSpPr>
         <p:spPr>
           <a:xfrm>
-            <a:off x="1989806" y="6181655"/>
+            <a:off x="1919467" y="6224010"/>
             <a:ext cx="9020907" cy="430822"/>
           </a:xfrm>
           <a:prstGeom prst="rect">
@@ -10377,7 +10312,7 @@
         </p:nvSpPr>
         <p:spPr>
           <a:xfrm>
-            <a:off x="720969" y="489472"/>
+            <a:off x="782515" y="384735"/>
             <a:ext cx="10383716" cy="513638"/>
           </a:xfrm>
           <a:prstGeom prst="rect">
@@ -10436,6 +10371,531 @@
               </a:rPr>
               <a:t>Attendance / Metro Population</a:t>
             </a:r>
+          </a:p>
+        </p:txBody>
+      </p:sp>
+      <p:sp>
+        <p:nvSpPr>
+          <p:cNvPr id="7" name="Text Placeholder 2">
+            <a:extLst>
+              <a:ext uri="{FF2B5EF4-FFF2-40B4-BE49-F238E27FC236}">
+                <a16:creationId xmlns:a16="http://schemas.microsoft.com/office/drawing/2014/main" id="{2F6A1A4E-2FA6-4F1E-A62B-6EE15D59EA84}"/>
+              </a:ext>
+            </a:extLst>
+          </p:cNvPr>
+          <p:cNvSpPr txBox="1">
+            <a:spLocks/>
+          </p:cNvSpPr>
+          <p:nvPr/>
+        </p:nvSpPr>
+        <p:spPr>
+          <a:xfrm>
+            <a:off x="108625" y="650632"/>
+            <a:ext cx="12675533" cy="5717896"/>
+          </a:xfrm>
+          <a:prstGeom prst="rect">
+            <a:avLst/>
+          </a:prstGeom>
+        </p:spPr>
+        <p:txBody>
+          <a:bodyPr vert="horz" lIns="91440" tIns="45720" rIns="91440" bIns="45720" rtlCol="0" anchor="t">
+            <a:normAutofit/>
+          </a:bodyPr>
+          <a:lstStyle>
+            <a:lvl1pPr marL="0" indent="0" algn="ctr" defTabSz="914400" rtl="0" eaLnBrk="1" latinLnBrk="0" hangingPunct="1">
+              <a:lnSpc>
+                <a:spcPct val="90000"/>
+              </a:lnSpc>
+              <a:spcBef>
+                <a:spcPts val="0"/>
+              </a:spcBef>
+              <a:buClr>
+                <a:schemeClr val="tx2"/>
+              </a:buClr>
+              <a:buSzPct val="100000"/>
+              <a:buFont typeface="Arial" pitchFamily="34" charset="0"/>
+              <a:buNone/>
+              <a:defRPr sz="2400" kern="1200" cap="none" baseline="0">
+                <a:solidFill>
+                  <a:schemeClr val="tx2"/>
+                </a:solidFill>
+                <a:latin typeface="+mn-lt"/>
+                <a:ea typeface="+mn-ea"/>
+                <a:cs typeface="+mn-cs"/>
+              </a:defRPr>
+            </a:lvl1pPr>
+            <a:lvl2pPr marL="457200" indent="0" algn="l" defTabSz="914400" rtl="0" eaLnBrk="1" latinLnBrk="0" hangingPunct="1">
+              <a:lnSpc>
+                <a:spcPct val="90000"/>
+              </a:lnSpc>
+              <a:spcBef>
+                <a:spcPts val="1000"/>
+              </a:spcBef>
+              <a:buClr>
+                <a:schemeClr val="tx2"/>
+              </a:buClr>
+              <a:buSzPct val="100000"/>
+              <a:buFont typeface="Arial" pitchFamily="34" charset="0"/>
+              <a:buNone/>
+              <a:defRPr sz="1800" kern="1200">
+                <a:solidFill>
+                  <a:schemeClr val="tx1">
+                    <a:tint val="75000"/>
+                  </a:schemeClr>
+                </a:solidFill>
+                <a:latin typeface="+mn-lt"/>
+                <a:ea typeface="+mn-ea"/>
+                <a:cs typeface="+mn-cs"/>
+              </a:defRPr>
+            </a:lvl2pPr>
+            <a:lvl3pPr marL="914400" indent="0" algn="l" defTabSz="914400" rtl="0" eaLnBrk="1" latinLnBrk="0" hangingPunct="1">
+              <a:lnSpc>
+                <a:spcPct val="90000"/>
+              </a:lnSpc>
+              <a:spcBef>
+                <a:spcPts val="800"/>
+              </a:spcBef>
+              <a:buClr>
+                <a:schemeClr val="tx2"/>
+              </a:buClr>
+              <a:buSzPct val="100000"/>
+              <a:buFont typeface="Arial" pitchFamily="34" charset="0"/>
+              <a:buNone/>
+              <a:defRPr sz="1600" kern="1200">
+                <a:solidFill>
+                  <a:schemeClr val="tx1">
+                    <a:tint val="75000"/>
+                  </a:schemeClr>
+                </a:solidFill>
+                <a:latin typeface="+mn-lt"/>
+                <a:ea typeface="+mn-ea"/>
+                <a:cs typeface="+mn-cs"/>
+              </a:defRPr>
+            </a:lvl3pPr>
+            <a:lvl4pPr marL="1371600" indent="0" algn="l" defTabSz="914400" rtl="0" eaLnBrk="1" latinLnBrk="0" hangingPunct="1">
+              <a:lnSpc>
+                <a:spcPct val="90000"/>
+              </a:lnSpc>
+              <a:spcBef>
+                <a:spcPts val="800"/>
+              </a:spcBef>
+              <a:buClr>
+                <a:schemeClr val="tx2"/>
+              </a:buClr>
+              <a:buSzPct val="100000"/>
+              <a:buFont typeface="Arial" pitchFamily="34" charset="0"/>
+              <a:buNone/>
+              <a:defRPr sz="1400" kern="1200">
+                <a:solidFill>
+                  <a:schemeClr val="tx1">
+                    <a:tint val="75000"/>
+                  </a:schemeClr>
+                </a:solidFill>
+                <a:latin typeface="+mn-lt"/>
+                <a:ea typeface="+mn-ea"/>
+                <a:cs typeface="+mn-cs"/>
+              </a:defRPr>
+            </a:lvl4pPr>
+            <a:lvl5pPr marL="1828800" indent="0" algn="l" defTabSz="914400" rtl="0" eaLnBrk="1" latinLnBrk="0" hangingPunct="1">
+              <a:lnSpc>
+                <a:spcPct val="90000"/>
+              </a:lnSpc>
+              <a:spcBef>
+                <a:spcPts val="800"/>
+              </a:spcBef>
+              <a:buClr>
+                <a:schemeClr val="tx2"/>
+              </a:buClr>
+              <a:buSzPct val="100000"/>
+              <a:buFont typeface="Arial" pitchFamily="34" charset="0"/>
+              <a:buNone/>
+              <a:defRPr sz="1400" kern="1200">
+                <a:solidFill>
+                  <a:schemeClr val="tx1">
+                    <a:tint val="75000"/>
+                  </a:schemeClr>
+                </a:solidFill>
+                <a:latin typeface="+mn-lt"/>
+                <a:ea typeface="+mn-ea"/>
+                <a:cs typeface="+mn-cs"/>
+              </a:defRPr>
+            </a:lvl5pPr>
+            <a:lvl6pPr marL="2286000" indent="0" algn="l" defTabSz="914400" rtl="0" eaLnBrk="1" latinLnBrk="0" hangingPunct="1">
+              <a:lnSpc>
+                <a:spcPct val="90000"/>
+              </a:lnSpc>
+              <a:spcBef>
+                <a:spcPts val="800"/>
+              </a:spcBef>
+              <a:buSzPct val="100000"/>
+              <a:buFont typeface="Arial" pitchFamily="34" charset="0"/>
+              <a:buNone/>
+              <a:defRPr sz="1400" kern="1200">
+                <a:solidFill>
+                  <a:schemeClr val="tx1">
+                    <a:tint val="75000"/>
+                  </a:schemeClr>
+                </a:solidFill>
+                <a:latin typeface="+mn-lt"/>
+                <a:ea typeface="+mn-ea"/>
+                <a:cs typeface="+mn-cs"/>
+              </a:defRPr>
+            </a:lvl6pPr>
+            <a:lvl7pPr marL="2743200" indent="0" algn="l" defTabSz="914400" rtl="0" eaLnBrk="1" latinLnBrk="0" hangingPunct="1">
+              <a:lnSpc>
+                <a:spcPct val="90000"/>
+              </a:lnSpc>
+              <a:spcBef>
+                <a:spcPts val="800"/>
+              </a:spcBef>
+              <a:buSzPct val="100000"/>
+              <a:buFont typeface="Arial" pitchFamily="34" charset="0"/>
+              <a:buNone/>
+              <a:defRPr sz="1400" kern="1200" baseline="0">
+                <a:solidFill>
+                  <a:schemeClr val="tx1">
+                    <a:tint val="75000"/>
+                  </a:schemeClr>
+                </a:solidFill>
+                <a:latin typeface="+mn-lt"/>
+                <a:ea typeface="+mn-ea"/>
+                <a:cs typeface="+mn-cs"/>
+              </a:defRPr>
+            </a:lvl7pPr>
+            <a:lvl8pPr marL="3200400" indent="0" algn="l" defTabSz="914400" rtl="0" eaLnBrk="1" latinLnBrk="0" hangingPunct="1">
+              <a:lnSpc>
+                <a:spcPct val="90000"/>
+              </a:lnSpc>
+              <a:spcBef>
+                <a:spcPts val="800"/>
+              </a:spcBef>
+              <a:buSzPct val="100000"/>
+              <a:buFont typeface="Arial" pitchFamily="34" charset="0"/>
+              <a:buNone/>
+              <a:defRPr sz="1400" kern="1200" baseline="0">
+                <a:solidFill>
+                  <a:schemeClr val="tx1">
+                    <a:tint val="75000"/>
+                  </a:schemeClr>
+                </a:solidFill>
+                <a:latin typeface="+mn-lt"/>
+                <a:ea typeface="+mn-ea"/>
+                <a:cs typeface="+mn-cs"/>
+              </a:defRPr>
+            </a:lvl8pPr>
+            <a:lvl9pPr marL="3657600" indent="0" algn="l" defTabSz="914400" rtl="0" eaLnBrk="1" latinLnBrk="0" hangingPunct="1">
+              <a:lnSpc>
+                <a:spcPct val="90000"/>
+              </a:lnSpc>
+              <a:spcBef>
+                <a:spcPts val="800"/>
+              </a:spcBef>
+              <a:buSzPct val="100000"/>
+              <a:buFont typeface="Arial" pitchFamily="34" charset="0"/>
+              <a:buNone/>
+              <a:defRPr sz="1400" kern="1200" baseline="0">
+                <a:solidFill>
+                  <a:schemeClr val="tx1">
+                    <a:tint val="75000"/>
+                  </a:schemeClr>
+                </a:solidFill>
+                <a:latin typeface="+mn-lt"/>
+                <a:ea typeface="+mn-ea"/>
+                <a:cs typeface="+mn-cs"/>
+              </a:defRPr>
+            </a:lvl9pPr>
+          </a:lstStyle>
+          <a:p>
+            <a:pPr lvl="1" algn="just">
+              <a:lnSpc>
+                <a:spcPct val="100000"/>
+              </a:lnSpc>
+            </a:pPr>
+            <a:endParaRPr lang="en-US" sz="2200" b="1">
+              <a:solidFill>
+                <a:schemeClr val="tx1"/>
+              </a:solidFill>
+            </a:endParaRPr>
+          </a:p>
+          <a:p>
+            <a:pPr marL="800100" lvl="1" indent="-342900">
+              <a:lnSpc>
+                <a:spcPct val="100000"/>
+              </a:lnSpc>
+              <a:buFont typeface="Wingdings" panose="05000000000000000000" pitchFamily="2" charset="2"/>
+              <a:buChar char="Ø"/>
+            </a:pPr>
+            <a:endParaRPr lang="en-US" sz="2200"/>
+          </a:p>
+          <a:p>
+            <a:pPr>
+              <a:lnSpc>
+                <a:spcPct val="100000"/>
+              </a:lnSpc>
+            </a:pPr>
+            <a:endParaRPr lang="en-US" sz="2800"/>
+          </a:p>
+          <a:p>
+            <a:pPr>
+              <a:lnSpc>
+                <a:spcPct val="100000"/>
+              </a:lnSpc>
+            </a:pPr>
+            <a:endParaRPr lang="en-US" sz="2800"/>
+          </a:p>
+          <a:p>
+            <a:pPr marL="342900" indent="-342900">
+              <a:lnSpc>
+                <a:spcPct val="150000"/>
+              </a:lnSpc>
+              <a:buFont typeface="Wingdings" panose="05000000000000000000" pitchFamily="2" charset="2"/>
+              <a:buChar char="Ø"/>
+            </a:pPr>
+            <a:endParaRPr lang="en-US" sz="2800"/>
+          </a:p>
+          <a:p>
+            <a:pPr marL="800100" lvl="1" indent="-342900">
+              <a:lnSpc>
+                <a:spcPct val="150000"/>
+              </a:lnSpc>
+              <a:buFont typeface="Wingdings" panose="05000000000000000000" pitchFamily="2" charset="2"/>
+              <a:buChar char="Ø"/>
+            </a:pPr>
+            <a:endParaRPr lang="en-US" sz="2200"/>
+          </a:p>
+          <a:p>
+            <a:pPr marL="1257300" lvl="2" indent="-342900">
+              <a:lnSpc>
+                <a:spcPct val="150000"/>
+              </a:lnSpc>
+              <a:buFont typeface="Wingdings" panose="05000000000000000000" pitchFamily="2" charset="2"/>
+              <a:buChar char="Ø"/>
+            </a:pPr>
+            <a:endParaRPr lang="en-US" sz="2000"/>
+          </a:p>
+          <a:p>
+            <a:pPr algn="l">
+              <a:lnSpc>
+                <a:spcPct val="120000"/>
+              </a:lnSpc>
+            </a:pPr>
+            <a:endParaRPr lang="en-US" sz="2600" b="1">
+              <a:solidFill>
+                <a:schemeClr val="tx1"/>
+              </a:solidFill>
+            </a:endParaRPr>
+          </a:p>
+          <a:p>
+            <a:pPr algn="l">
+              <a:lnSpc>
+                <a:spcPct val="120000"/>
+              </a:lnSpc>
+            </a:pPr>
+            <a:endParaRPr lang="en-US" sz="2600" b="1">
+              <a:solidFill>
+                <a:schemeClr val="tx1"/>
+              </a:solidFill>
+            </a:endParaRPr>
+          </a:p>
+          <a:p>
+            <a:pPr algn="l">
+              <a:lnSpc>
+                <a:spcPct val="120000"/>
+              </a:lnSpc>
+            </a:pPr>
+            <a:endParaRPr lang="en-US" sz="2600" b="1">
+              <a:solidFill>
+                <a:schemeClr val="tx1"/>
+              </a:solidFill>
+            </a:endParaRPr>
+          </a:p>
+          <a:p>
+            <a:pPr marL="342900" indent="-342900" algn="l">
+              <a:lnSpc>
+                <a:spcPct val="120000"/>
+              </a:lnSpc>
+              <a:buFont typeface="Wingdings" panose="05000000000000000000" pitchFamily="2" charset="2"/>
+              <a:buChar char="Ø"/>
+            </a:pPr>
+            <a:endParaRPr lang="en-US" sz="2600" b="1">
+              <a:solidFill>
+                <a:schemeClr val="tx1"/>
+              </a:solidFill>
+            </a:endParaRPr>
+          </a:p>
+          <a:p>
+            <a:pPr algn="l">
+              <a:lnSpc>
+                <a:spcPct val="120000"/>
+              </a:lnSpc>
+            </a:pPr>
+            <a:endParaRPr lang="en-US" sz="1400" b="1">
+              <a:solidFill>
+                <a:schemeClr val="tx1"/>
+              </a:solidFill>
+            </a:endParaRPr>
+          </a:p>
+          <a:p>
+            <a:pPr lvl="1"/>
+            <a:endParaRPr lang="en-US" dirty="0"/>
+          </a:p>
+        </p:txBody>
+      </p:sp>
+      <p:pic>
+        <p:nvPicPr>
+          <p:cNvPr id="8" name="Picture 2" descr="figure4.png">
+            <a:extLst>
+              <a:ext uri="{FF2B5EF4-FFF2-40B4-BE49-F238E27FC236}">
+                <a16:creationId xmlns:a16="http://schemas.microsoft.com/office/drawing/2014/main" id="{947B2087-1EA4-46DC-A0A8-CA88E8AB35E3}"/>
+              </a:ext>
+            </a:extLst>
+          </p:cNvPr>
+          <p:cNvPicPr>
+            <a:picLocks noChangeAspect="1" noChangeArrowheads="1"/>
+          </p:cNvPicPr>
+          <p:nvPr/>
+        </p:nvPicPr>
+        <p:blipFill>
+          <a:blip r:embed="rId3">
+            <a:extLst>
+              <a:ext uri="{28A0092B-C50C-407E-A947-70E740481C1C}">
+                <a14:useLocalDpi xmlns:a14="http://schemas.microsoft.com/office/drawing/2010/main" val="0"/>
+              </a:ext>
+            </a:extLst>
+          </a:blip>
+          <a:srcRect/>
+          <a:stretch>
+            <a:fillRect/>
+          </a:stretch>
+        </p:blipFill>
+        <p:spPr bwMode="auto">
+          <a:xfrm>
+            <a:off x="260838" y="898373"/>
+            <a:ext cx="11837378" cy="5470155"/>
+          </a:xfrm>
+          <a:prstGeom prst="rect">
+            <a:avLst/>
+          </a:prstGeom>
+          <a:noFill/>
+          <a:extLst>
+            <a:ext uri="{909E8E84-426E-40DD-AFC4-6F175D3DCCD1}">
+              <a14:hiddenFill xmlns:a14="http://schemas.microsoft.com/office/drawing/2010/main">
+                <a:solidFill>
+                  <a:srgbClr val="FFFFFF"/>
+                </a:solidFill>
+              </a14:hiddenFill>
+            </a:ext>
+          </a:extLst>
+        </p:spPr>
+      </p:pic>
+      <p:sp>
+        <p:nvSpPr>
+          <p:cNvPr id="9" name="Rectangle 8">
+            <a:extLst>
+              <a:ext uri="{FF2B5EF4-FFF2-40B4-BE49-F238E27FC236}">
+                <a16:creationId xmlns:a16="http://schemas.microsoft.com/office/drawing/2014/main" id="{73BDDC70-85D6-49D1-9105-A80BD81D08A8}"/>
+              </a:ext>
+            </a:extLst>
+          </p:cNvPr>
+          <p:cNvSpPr/>
+          <p:nvPr/>
+        </p:nvSpPr>
+        <p:spPr>
+          <a:xfrm>
+            <a:off x="1935937" y="5195310"/>
+            <a:ext cx="9020907" cy="430822"/>
+          </a:xfrm>
+          <a:prstGeom prst="rect">
+            <a:avLst/>
+          </a:prstGeom>
+          <a:solidFill>
+            <a:schemeClr val="bg2"/>
+          </a:solidFill>
+          <a:ln>
+            <a:noFill/>
+          </a:ln>
+        </p:spPr>
+        <p:style>
+          <a:lnRef idx="2">
+            <a:schemeClr val="accent1">
+              <a:shade val="50000"/>
+            </a:schemeClr>
+          </a:lnRef>
+          <a:fillRef idx="1">
+            <a:schemeClr val="accent1"/>
+          </a:fillRef>
+          <a:effectRef idx="0">
+            <a:schemeClr val="accent1"/>
+          </a:effectRef>
+          <a:fontRef idx="minor">
+            <a:schemeClr val="lt1"/>
+          </a:fontRef>
+        </p:style>
+        <p:txBody>
+          <a:bodyPr rtlCol="0" anchor="ctr"/>
+          <a:lstStyle/>
+          <a:p>
+            <a:r>
+              <a:rPr lang="en-US" sz="1600" dirty="0">
+                <a:solidFill>
+                  <a:schemeClr val="tx1"/>
+                </a:solidFill>
+                <a:latin typeface="Calibri" panose="020F0502020204030204" pitchFamily="34" charset="0"/>
+              </a:rPr>
+              <a:t>  1   2   3    4    5    6    7    8    9   10  11  12   13 14 15 16  17  18 19  20   21 22  23 24  25  26  27 28  29  30</a:t>
+            </a:r>
+          </a:p>
+        </p:txBody>
+      </p:sp>
+      <p:sp>
+        <p:nvSpPr>
+          <p:cNvPr id="10" name="Oval 9">
+            <a:extLst>
+              <a:ext uri="{FF2B5EF4-FFF2-40B4-BE49-F238E27FC236}">
+                <a16:creationId xmlns:a16="http://schemas.microsoft.com/office/drawing/2014/main" id="{E1094F6F-3B02-4B9B-92D2-AAFE0C68B9F8}"/>
+              </a:ext>
+            </a:extLst>
+          </p:cNvPr>
+          <p:cNvSpPr/>
+          <p:nvPr/>
+        </p:nvSpPr>
+        <p:spPr>
+          <a:xfrm>
+            <a:off x="2285999" y="5202669"/>
+            <a:ext cx="467862" cy="846925"/>
+          </a:xfrm>
+          <a:prstGeom prst="ellipse">
+            <a:avLst/>
+          </a:prstGeom>
+          <a:noFill/>
+          <a:ln w="25400">
+            <a:solidFill>
+              <a:srgbClr val="FF0000"/>
+            </a:solidFill>
+          </a:ln>
+        </p:spPr>
+        <p:style>
+          <a:lnRef idx="2">
+            <a:schemeClr val="accent1">
+              <a:shade val="50000"/>
+            </a:schemeClr>
+          </a:lnRef>
+          <a:fillRef idx="1">
+            <a:schemeClr val="accent1"/>
+          </a:fillRef>
+          <a:effectRef idx="0">
+            <a:schemeClr val="accent1"/>
+          </a:effectRef>
+          <a:fontRef idx="minor">
+            <a:schemeClr val="lt1"/>
+          </a:fontRef>
+        </p:style>
+        <p:txBody>
+          <a:bodyPr rtlCol="0" anchor="ctr"/>
+          <a:lstStyle/>
+          <a:p>
+            <a:pPr algn="ctr"/>
+            <a:endParaRPr lang="en-US"/>
           </a:p>
         </p:txBody>
       </p:sp>
@@ -10932,169 +11392,6 @@
       </p:grpSpPr>
       <p:sp>
         <p:nvSpPr>
-          <p:cNvPr id="3" name="Text Placeholder 2">
-            <a:extLst>
-              <a:ext uri="{FF2B5EF4-FFF2-40B4-BE49-F238E27FC236}">
-                <a16:creationId xmlns:a16="http://schemas.microsoft.com/office/drawing/2014/main" id="{63DB945B-BA46-4345-9E4B-6430F74A196B}"/>
-              </a:ext>
-            </a:extLst>
-          </p:cNvPr>
-          <p:cNvSpPr>
-            <a:spLocks noGrp="1"/>
-          </p:cNvSpPr>
-          <p:nvPr>
-            <p:ph type="body" idx="1"/>
-          </p:nvPr>
-        </p:nvSpPr>
-        <p:spPr>
-          <a:xfrm>
-            <a:off x="108626" y="650632"/>
-            <a:ext cx="11989590" cy="5717896"/>
-          </a:xfrm>
-        </p:spPr>
-        <p:txBody>
-          <a:bodyPr>
-            <a:normAutofit/>
-          </a:bodyPr>
-          <a:lstStyle/>
-          <a:p>
-            <a:pPr lvl="1" algn="just">
-              <a:lnSpc>
-                <a:spcPct val="100000"/>
-              </a:lnSpc>
-            </a:pPr>
-            <a:endParaRPr lang="en-US" sz="2200" b="1" dirty="0">
-              <a:solidFill>
-                <a:schemeClr val="tx1"/>
-              </a:solidFill>
-            </a:endParaRPr>
-          </a:p>
-          <a:p>
-            <a:pPr marL="800100" lvl="1" indent="-342900">
-              <a:lnSpc>
-                <a:spcPct val="100000"/>
-              </a:lnSpc>
-              <a:buFont typeface="Wingdings" panose="05000000000000000000" pitchFamily="2" charset="2"/>
-              <a:buChar char="Ø"/>
-            </a:pPr>
-            <a:endParaRPr lang="en-US" sz="2200" dirty="0"/>
-          </a:p>
-          <a:p>
-            <a:pPr>
-              <a:lnSpc>
-                <a:spcPct val="100000"/>
-              </a:lnSpc>
-            </a:pPr>
-            <a:endParaRPr lang="en-US" sz="2800" dirty="0"/>
-          </a:p>
-          <a:p>
-            <a:pPr>
-              <a:lnSpc>
-                <a:spcPct val="100000"/>
-              </a:lnSpc>
-            </a:pPr>
-            <a:endParaRPr lang="en-US" sz="2800" dirty="0"/>
-          </a:p>
-          <a:p>
-            <a:pPr marL="342900" indent="-342900">
-              <a:lnSpc>
-                <a:spcPct val="150000"/>
-              </a:lnSpc>
-              <a:buFont typeface="Wingdings" panose="05000000000000000000" pitchFamily="2" charset="2"/>
-              <a:buChar char="Ø"/>
-            </a:pPr>
-            <a:endParaRPr lang="en-US" sz="2800" dirty="0"/>
-          </a:p>
-          <a:p>
-            <a:pPr marL="800100" lvl="1" indent="-342900">
-              <a:lnSpc>
-                <a:spcPct val="150000"/>
-              </a:lnSpc>
-              <a:buFont typeface="Wingdings" panose="05000000000000000000" pitchFamily="2" charset="2"/>
-              <a:buChar char="Ø"/>
-            </a:pPr>
-            <a:endParaRPr lang="en-US" sz="2200" dirty="0"/>
-          </a:p>
-          <a:p>
-            <a:pPr marL="1257300" lvl="2" indent="-342900">
-              <a:lnSpc>
-                <a:spcPct val="150000"/>
-              </a:lnSpc>
-              <a:buFont typeface="Wingdings" panose="05000000000000000000" pitchFamily="2" charset="2"/>
-              <a:buChar char="Ø"/>
-            </a:pPr>
-            <a:endParaRPr lang="en-US" sz="2000" dirty="0"/>
-          </a:p>
-          <a:p>
-            <a:pPr algn="l">
-              <a:lnSpc>
-                <a:spcPct val="120000"/>
-              </a:lnSpc>
-            </a:pPr>
-            <a:endParaRPr lang="en-US" sz="2600" b="1" dirty="0">
-              <a:solidFill>
-                <a:schemeClr val="tx1"/>
-              </a:solidFill>
-            </a:endParaRPr>
-          </a:p>
-          <a:p>
-            <a:pPr algn="l">
-              <a:lnSpc>
-                <a:spcPct val="120000"/>
-              </a:lnSpc>
-            </a:pPr>
-            <a:endParaRPr lang="en-US" sz="2600" b="1" dirty="0">
-              <a:solidFill>
-                <a:schemeClr val="tx1"/>
-              </a:solidFill>
-            </a:endParaRPr>
-          </a:p>
-          <a:p>
-            <a:pPr algn="l">
-              <a:lnSpc>
-                <a:spcPct val="120000"/>
-              </a:lnSpc>
-            </a:pPr>
-            <a:endParaRPr lang="en-US" sz="2600" b="1" dirty="0">
-              <a:solidFill>
-                <a:schemeClr val="tx1"/>
-              </a:solidFill>
-            </a:endParaRPr>
-          </a:p>
-          <a:p>
-            <a:pPr marL="342900" indent="-342900" algn="l">
-              <a:lnSpc>
-                <a:spcPct val="120000"/>
-              </a:lnSpc>
-              <a:buFont typeface="Wingdings" panose="05000000000000000000" pitchFamily="2" charset="2"/>
-              <a:buChar char="Ø"/>
-            </a:pPr>
-            <a:endParaRPr lang="en-US" sz="2600" b="1" dirty="0">
-              <a:solidFill>
-                <a:schemeClr val="tx1"/>
-              </a:solidFill>
-            </a:endParaRPr>
-          </a:p>
-          <a:p>
-            <a:pPr algn="l">
-              <a:lnSpc>
-                <a:spcPct val="120000"/>
-              </a:lnSpc>
-            </a:pPr>
-            <a:endParaRPr lang="en-US" sz="1400" b="1" dirty="0">
-              <a:solidFill>
-                <a:schemeClr val="tx1"/>
-              </a:solidFill>
-            </a:endParaRPr>
-          </a:p>
-          <a:p>
-            <a:pPr lvl="1"/>
-            <a:endParaRPr lang="en-US" dirty="0"/>
-          </a:p>
-        </p:txBody>
-      </p:sp>
-      <p:sp>
-        <p:nvSpPr>
           <p:cNvPr id="4" name="Rectangle 3">
             <a:extLst>
               <a:ext uri="{FF2B5EF4-FFF2-40B4-BE49-F238E27FC236}">
@@ -11298,6 +11595,164 @@
           </a:p>
         </p:txBody>
       </p:sp>
+      <p:pic>
+        <p:nvPicPr>
+          <p:cNvPr id="4100" name="Picture 4" descr="figure5.png">
+            <a:extLst>
+              <a:ext uri="{FF2B5EF4-FFF2-40B4-BE49-F238E27FC236}">
+                <a16:creationId xmlns:a16="http://schemas.microsoft.com/office/drawing/2014/main" id="{4D4CAD37-A577-43CF-8839-0CD449386832}"/>
+              </a:ext>
+            </a:extLst>
+          </p:cNvPr>
+          <p:cNvPicPr>
+            <a:picLocks noChangeAspect="1" noChangeArrowheads="1"/>
+          </p:cNvPicPr>
+          <p:nvPr/>
+        </p:nvPicPr>
+        <p:blipFill>
+          <a:blip r:embed="rId3">
+            <a:extLst>
+              <a:ext uri="{28A0092B-C50C-407E-A947-70E740481C1C}">
+                <a14:useLocalDpi xmlns:a14="http://schemas.microsoft.com/office/drawing/2010/main" val="0"/>
+              </a:ext>
+            </a:extLst>
+          </a:blip>
+          <a:srcRect/>
+          <a:stretch>
+            <a:fillRect/>
+          </a:stretch>
+        </p:blipFill>
+        <p:spPr bwMode="auto">
+          <a:xfrm>
+            <a:off x="233729" y="985758"/>
+            <a:ext cx="11648342" cy="5552343"/>
+          </a:xfrm>
+          <a:prstGeom prst="rect">
+            <a:avLst/>
+          </a:prstGeom>
+          <a:noFill/>
+          <a:extLst>
+            <a:ext uri="{909E8E84-426E-40DD-AFC4-6F175D3DCCD1}">
+              <a14:hiddenFill xmlns:a14="http://schemas.microsoft.com/office/drawing/2010/main">
+                <a:solidFill>
+                  <a:srgbClr val="FFFFFF"/>
+                </a:solidFill>
+              </a14:hiddenFill>
+            </a:ext>
+          </a:extLst>
+        </p:spPr>
+      </p:pic>
+      <p:sp>
+        <p:nvSpPr>
+          <p:cNvPr id="12" name="Rectangle 11">
+            <a:extLst>
+              <a:ext uri="{FF2B5EF4-FFF2-40B4-BE49-F238E27FC236}">
+                <a16:creationId xmlns:a16="http://schemas.microsoft.com/office/drawing/2014/main" id="{8866B029-ABB3-445A-9244-678A9293AF2E}"/>
+              </a:ext>
+            </a:extLst>
+          </p:cNvPr>
+          <p:cNvSpPr/>
+          <p:nvPr/>
+        </p:nvSpPr>
+        <p:spPr>
+          <a:xfrm>
+            <a:off x="1953522" y="5344779"/>
+            <a:ext cx="9020907" cy="430822"/>
+          </a:xfrm>
+          <a:prstGeom prst="rect">
+            <a:avLst/>
+          </a:prstGeom>
+          <a:solidFill>
+            <a:schemeClr val="bg2"/>
+          </a:solidFill>
+          <a:ln>
+            <a:noFill/>
+          </a:ln>
+        </p:spPr>
+        <p:style>
+          <a:lnRef idx="2">
+            <a:schemeClr val="accent1">
+              <a:shade val="50000"/>
+            </a:schemeClr>
+          </a:lnRef>
+          <a:fillRef idx="1">
+            <a:schemeClr val="accent1"/>
+          </a:fillRef>
+          <a:effectRef idx="0">
+            <a:schemeClr val="accent1"/>
+          </a:effectRef>
+          <a:fontRef idx="minor">
+            <a:schemeClr val="lt1"/>
+          </a:fontRef>
+        </p:style>
+        <p:txBody>
+          <a:bodyPr rtlCol="0" anchor="ctr"/>
+          <a:lstStyle/>
+          <a:p>
+            <a:r>
+              <a:rPr lang="en-US" sz="1600" dirty="0">
+                <a:solidFill>
+                  <a:schemeClr val="tx1"/>
+                </a:solidFill>
+                <a:latin typeface="Calibri" panose="020F0502020204030204" pitchFamily="34" charset="0"/>
+              </a:rPr>
+              <a:t>  1    2   3    4    5    6    7    8    9   10 11 12  13 14 15 16  17  18 19  20  21 22  23 24  25 26  27 28  29  30</a:t>
+            </a:r>
+          </a:p>
+        </p:txBody>
+      </p:sp>
+      <p:sp>
+        <p:nvSpPr>
+          <p:cNvPr id="13" name="Oval 12">
+            <a:extLst>
+              <a:ext uri="{FF2B5EF4-FFF2-40B4-BE49-F238E27FC236}">
+                <a16:creationId xmlns:a16="http://schemas.microsoft.com/office/drawing/2014/main" id="{3D6887B5-3795-4201-933D-C0E04457FFE2}"/>
+              </a:ext>
+            </a:extLst>
+          </p:cNvPr>
+          <p:cNvSpPr/>
+          <p:nvPr/>
+        </p:nvSpPr>
+        <p:spPr>
+          <a:xfrm>
+            <a:off x="1929014" y="5289648"/>
+            <a:ext cx="545124" cy="890400"/>
+          </a:xfrm>
+          <a:prstGeom prst="ellipse">
+            <a:avLst/>
+          </a:prstGeom>
+          <a:noFill/>
+          <a:ln w="25400">
+            <a:solidFill>
+              <a:srgbClr val="FF0000"/>
+            </a:solidFill>
+          </a:ln>
+        </p:spPr>
+        <p:style>
+          <a:lnRef idx="2">
+            <a:schemeClr val="accent1">
+              <a:shade val="50000"/>
+            </a:schemeClr>
+          </a:lnRef>
+          <a:fillRef idx="1">
+            <a:schemeClr val="accent1"/>
+          </a:fillRef>
+          <a:effectRef idx="0">
+            <a:schemeClr val="accent1"/>
+          </a:effectRef>
+          <a:fontRef idx="minor">
+            <a:schemeClr val="lt1"/>
+          </a:fontRef>
+        </p:style>
+        <p:txBody>
+          <a:bodyPr rtlCol="0" anchor="ctr"/>
+          <a:lstStyle/>
+          <a:p>
+            <a:pPr algn="ctr"/>
+            <a:endParaRPr lang="en-US"/>
+          </a:p>
+        </p:txBody>
+      </p:sp>
     </p:spTree>
     <p:extLst>
       <p:ext uri="{BB962C8B-B14F-4D97-AF65-F5344CB8AC3E}">
@@ -11704,6 +12159,53 @@
           </a:p>
         </p:txBody>
       </p:sp>
+      <p:pic>
+        <p:nvPicPr>
+          <p:cNvPr id="7" name="Picture 4" descr="figure5.png">
+            <a:extLst>
+              <a:ext uri="{FF2B5EF4-FFF2-40B4-BE49-F238E27FC236}">
+                <a16:creationId xmlns:a16="http://schemas.microsoft.com/office/drawing/2014/main" id="{6637D4F4-27BD-48AC-9F9C-102F80E450C2}"/>
+              </a:ext>
+            </a:extLst>
+          </p:cNvPr>
+          <p:cNvPicPr>
+            <a:picLocks noChangeAspect="1" noChangeArrowheads="1"/>
+          </p:cNvPicPr>
+          <p:nvPr/>
+        </p:nvPicPr>
+        <p:blipFill>
+          <a:blip r:embed="rId3">
+            <a:extLst>
+              <a:ext uri="{28A0092B-C50C-407E-A947-70E740481C1C}">
+                <a14:useLocalDpi xmlns:a14="http://schemas.microsoft.com/office/drawing/2010/main" val="0"/>
+              </a:ext>
+            </a:extLst>
+          </a:blip>
+          <a:srcRect/>
+          <a:stretch>
+            <a:fillRect/>
+          </a:stretch>
+        </p:blipFill>
+        <p:spPr bwMode="auto">
+          <a:xfrm>
+            <a:off x="430823" y="1095639"/>
+            <a:ext cx="11412416" cy="5434049"/>
+          </a:xfrm>
+          <a:prstGeom prst="rect">
+            <a:avLst/>
+          </a:prstGeom>
+          <a:noFill/>
+          <a:extLst>
+            <a:ext uri="{909E8E84-426E-40DD-AFC4-6F175D3DCCD1}">
+              <a14:hiddenFill xmlns:a14="http://schemas.microsoft.com/office/drawing/2010/main">
+                <a:solidFill>
+                  <a:srgbClr val="FFFFFF"/>
+                </a:solidFill>
+              </a14:hiddenFill>
+            </a:ext>
+          </a:extLst>
+        </p:spPr>
+      </p:pic>
     </p:spTree>
     <p:extLst>
       <p:ext uri="{BB962C8B-B14F-4D97-AF65-F5344CB8AC3E}">
@@ -11766,7 +12268,7 @@
         </p:spPr>
         <p:txBody>
           <a:bodyPr>
-            <a:normAutofit/>
+            <a:normAutofit lnSpcReduction="10000"/>
           </a:bodyPr>
           <a:lstStyle/>
           <a:p>
@@ -11789,7 +12291,147 @@
               <a:buFont typeface="Wingdings" panose="05000000000000000000" pitchFamily="2" charset="2"/>
               <a:buChar char="Ø"/>
             </a:pPr>
-            <a:endParaRPr lang="en-US" sz="2200" dirty="0"/>
+            <a:r>
+              <a:rPr lang="en-US" sz="2200" b="1" dirty="0">
+                <a:solidFill>
+                  <a:schemeClr val="tx1"/>
+                </a:solidFill>
+              </a:rPr>
+              <a:t>The New York Yankees have consistently been at the top of fan attendance with the L. A. Dodgers &amp; St. Louis Cardinals consistently in the top 3 in annual attendance.</a:t>
+            </a:r>
+          </a:p>
+          <a:p>
+            <a:pPr marL="800100" lvl="1" indent="-342900">
+              <a:lnSpc>
+                <a:spcPct val="100000"/>
+              </a:lnSpc>
+              <a:buFont typeface="Wingdings" panose="05000000000000000000" pitchFamily="2" charset="2"/>
+              <a:buChar char="Ø"/>
+            </a:pPr>
+            <a:r>
+              <a:rPr lang="en-US" sz="2200" b="1" dirty="0">
+                <a:solidFill>
+                  <a:schemeClr val="tx1"/>
+                </a:solidFill>
+              </a:rPr>
+              <a:t>The New York Yankees clearly have the best fans when it comes to “Away Game draw      power</a:t>
+            </a:r>
+          </a:p>
+          <a:p>
+            <a:pPr marL="1257300" lvl="2" indent="-342900">
+              <a:lnSpc>
+                <a:spcPct val="100000"/>
+              </a:lnSpc>
+              <a:buFont typeface="Wingdings" panose="05000000000000000000" pitchFamily="2" charset="2"/>
+              <a:buChar char="Ø"/>
+            </a:pPr>
+            <a:r>
+              <a:rPr lang="en-US" sz="2000" b="1" dirty="0">
+                <a:solidFill>
+                  <a:schemeClr val="tx1"/>
+                </a:solidFill>
+              </a:rPr>
+              <a:t>Larger metropolitan areas were found to consistently rank ahead of smaller metro areas!</a:t>
+            </a:r>
+          </a:p>
+          <a:p>
+            <a:pPr marL="800100" lvl="1" indent="-342900">
+              <a:lnSpc>
+                <a:spcPct val="100000"/>
+              </a:lnSpc>
+              <a:buFont typeface="Wingdings" panose="05000000000000000000" pitchFamily="2" charset="2"/>
+              <a:buChar char="Ø"/>
+            </a:pPr>
+            <a:r>
+              <a:rPr lang="en-US" sz="2200" b="1" dirty="0">
+                <a:solidFill>
+                  <a:schemeClr val="tx1"/>
+                </a:solidFill>
+              </a:rPr>
+              <a:t>The St. Louis Cardinals clearly show as the best fans when adjusting the attendance for the metropolitan area.</a:t>
+            </a:r>
+          </a:p>
+          <a:p>
+            <a:pPr marL="800100" lvl="1" indent="-342900">
+              <a:lnSpc>
+                <a:spcPct val="100000"/>
+              </a:lnSpc>
+              <a:buFont typeface="Wingdings" panose="05000000000000000000" pitchFamily="2" charset="2"/>
+              <a:buChar char="Ø"/>
+            </a:pPr>
+            <a:r>
+              <a:rPr lang="en-US" sz="2200" b="1" dirty="0">
+                <a:solidFill>
+                  <a:schemeClr val="tx1"/>
+                </a:solidFill>
+              </a:rPr>
+              <a:t>When using the attendance / win statistic, the Yankees, Dodgers and Cardinals drop significantly compared previous rankings due to their winning history.</a:t>
+            </a:r>
+          </a:p>
+          <a:p>
+            <a:pPr lvl="1">
+              <a:lnSpc>
+                <a:spcPct val="100000"/>
+              </a:lnSpc>
+            </a:pPr>
+            <a:endParaRPr lang="en-US" sz="2200" b="1" dirty="0">
+              <a:solidFill>
+                <a:schemeClr val="tx1"/>
+              </a:solidFill>
+            </a:endParaRPr>
+          </a:p>
+          <a:p>
+            <a:pPr marL="800100" lvl="1" indent="-342900">
+              <a:lnSpc>
+                <a:spcPct val="100000"/>
+              </a:lnSpc>
+              <a:buFont typeface="Wingdings" panose="05000000000000000000" pitchFamily="2" charset="2"/>
+              <a:buChar char="Ø"/>
+            </a:pPr>
+            <a:endParaRPr lang="en-US" sz="2200" b="1" dirty="0">
+              <a:solidFill>
+                <a:schemeClr val="tx1"/>
+              </a:solidFill>
+            </a:endParaRPr>
+          </a:p>
+          <a:p>
+            <a:pPr marL="800100" lvl="1" indent="-342900">
+              <a:lnSpc>
+                <a:spcPct val="100000"/>
+              </a:lnSpc>
+              <a:buFont typeface="Wingdings" panose="05000000000000000000" pitchFamily="2" charset="2"/>
+              <a:buChar char="Ø"/>
+            </a:pPr>
+            <a:r>
+              <a:rPr lang="en-US" sz="2200" b="1" dirty="0" err="1">
+                <a:solidFill>
+                  <a:schemeClr val="tx1"/>
+                </a:solidFill>
+              </a:rPr>
+              <a:t>Xxxxx</a:t>
+            </a:r>
+            <a:r>
+              <a:rPr lang="en-US" sz="2200" b="1" dirty="0">
+                <a:solidFill>
+                  <a:schemeClr val="tx1"/>
+                </a:solidFill>
+              </a:rPr>
+              <a:t> have the best fans in baseball.</a:t>
+            </a:r>
+          </a:p>
+          <a:p>
+            <a:pPr marL="800100" lvl="1" indent="-342900">
+              <a:lnSpc>
+                <a:spcPct val="100000"/>
+              </a:lnSpc>
+              <a:buFont typeface="Wingdings" panose="05000000000000000000" pitchFamily="2" charset="2"/>
+              <a:buChar char="Ø"/>
+            </a:pPr>
+            <a:endParaRPr lang="en-US" sz="2200" b="1" dirty="0">
+              <a:solidFill>
+                <a:schemeClr val="tx1"/>
+              </a:solidFill>
+            </a:endParaRPr>
           </a:p>
           <a:p>
             <a:pPr>
@@ -12128,6 +12770,323 @@
       <p:transition/>
     </mc:Fallback>
   </mc:AlternateContent>
+  <p:timing>
+    <p:tnLst>
+      <p:par>
+        <p:cTn id="1" dur="indefinite" restart="never" nodeType="tmRoot">
+          <p:childTnLst>
+            <p:seq concurrent="1" nextAc="seek">
+              <p:cTn id="2" dur="indefinite" nodeType="mainSeq">
+                <p:childTnLst>
+                  <p:par>
+                    <p:cTn id="3" fill="hold">
+                      <p:stCondLst>
+                        <p:cond delay="indefinite"/>
+                      </p:stCondLst>
+                      <p:childTnLst>
+                        <p:par>
+                          <p:cTn id="4" fill="hold">
+                            <p:stCondLst>
+                              <p:cond delay="0"/>
+                            </p:stCondLst>
+                            <p:childTnLst>
+                              <p:par>
+                                <p:cTn id="5" presetID="10" presetClass="entr" presetSubtype="0" fill="hold" nodeType="clickEffect">
+                                  <p:stCondLst>
+                                    <p:cond delay="0"/>
+                                  </p:stCondLst>
+                                  <p:childTnLst>
+                                    <p:set>
+                                      <p:cBhvr>
+                                        <p:cTn id="6" dur="1" fill="hold">
+                                          <p:stCondLst>
+                                            <p:cond delay="0"/>
+                                          </p:stCondLst>
+                                        </p:cTn>
+                                        <p:tgtEl>
+                                          <p:spTgt spid="3">
+                                            <p:txEl>
+                                              <p:pRg st="1" end="1"/>
+                                            </p:txEl>
+                                          </p:spTgt>
+                                        </p:tgtEl>
+                                        <p:attrNameLst>
+                                          <p:attrName>style.visibility</p:attrName>
+                                        </p:attrNameLst>
+                                      </p:cBhvr>
+                                      <p:to>
+                                        <p:strVal val="visible"/>
+                                      </p:to>
+                                    </p:set>
+                                    <p:animEffect transition="in" filter="fade">
+                                      <p:cBhvr>
+                                        <p:cTn id="7" dur="500"/>
+                                        <p:tgtEl>
+                                          <p:spTgt spid="3">
+                                            <p:txEl>
+                                              <p:pRg st="1" end="1"/>
+                                            </p:txEl>
+                                          </p:spTgt>
+                                        </p:tgtEl>
+                                      </p:cBhvr>
+                                    </p:animEffect>
+                                  </p:childTnLst>
+                                </p:cTn>
+                              </p:par>
+                            </p:childTnLst>
+                          </p:cTn>
+                        </p:par>
+                      </p:childTnLst>
+                    </p:cTn>
+                  </p:par>
+                  <p:par>
+                    <p:cTn id="8" fill="hold">
+                      <p:stCondLst>
+                        <p:cond delay="indefinite"/>
+                      </p:stCondLst>
+                      <p:childTnLst>
+                        <p:par>
+                          <p:cTn id="9" fill="hold">
+                            <p:stCondLst>
+                              <p:cond delay="0"/>
+                            </p:stCondLst>
+                            <p:childTnLst>
+                              <p:par>
+                                <p:cTn id="10" presetID="10" presetClass="entr" presetSubtype="0" fill="hold" nodeType="clickEffect">
+                                  <p:stCondLst>
+                                    <p:cond delay="0"/>
+                                  </p:stCondLst>
+                                  <p:childTnLst>
+                                    <p:set>
+                                      <p:cBhvr>
+                                        <p:cTn id="11" dur="1" fill="hold">
+                                          <p:stCondLst>
+                                            <p:cond delay="0"/>
+                                          </p:stCondLst>
+                                        </p:cTn>
+                                        <p:tgtEl>
+                                          <p:spTgt spid="3">
+                                            <p:txEl>
+                                              <p:pRg st="2" end="2"/>
+                                            </p:txEl>
+                                          </p:spTgt>
+                                        </p:tgtEl>
+                                        <p:attrNameLst>
+                                          <p:attrName>style.visibility</p:attrName>
+                                        </p:attrNameLst>
+                                      </p:cBhvr>
+                                      <p:to>
+                                        <p:strVal val="visible"/>
+                                      </p:to>
+                                    </p:set>
+                                    <p:animEffect transition="in" filter="fade">
+                                      <p:cBhvr>
+                                        <p:cTn id="12" dur="500"/>
+                                        <p:tgtEl>
+                                          <p:spTgt spid="3">
+                                            <p:txEl>
+                                              <p:pRg st="2" end="2"/>
+                                            </p:txEl>
+                                          </p:spTgt>
+                                        </p:tgtEl>
+                                      </p:cBhvr>
+                                    </p:animEffect>
+                                  </p:childTnLst>
+                                </p:cTn>
+                              </p:par>
+                              <p:par>
+                                <p:cTn id="13" presetID="10" presetClass="entr" presetSubtype="0" fill="hold" nodeType="withEffect">
+                                  <p:stCondLst>
+                                    <p:cond delay="0"/>
+                                  </p:stCondLst>
+                                  <p:childTnLst>
+                                    <p:set>
+                                      <p:cBhvr>
+                                        <p:cTn id="14" dur="1" fill="hold">
+                                          <p:stCondLst>
+                                            <p:cond delay="0"/>
+                                          </p:stCondLst>
+                                        </p:cTn>
+                                        <p:tgtEl>
+                                          <p:spTgt spid="3">
+                                            <p:txEl>
+                                              <p:pRg st="3" end="3"/>
+                                            </p:txEl>
+                                          </p:spTgt>
+                                        </p:tgtEl>
+                                        <p:attrNameLst>
+                                          <p:attrName>style.visibility</p:attrName>
+                                        </p:attrNameLst>
+                                      </p:cBhvr>
+                                      <p:to>
+                                        <p:strVal val="visible"/>
+                                      </p:to>
+                                    </p:set>
+                                    <p:animEffect transition="in" filter="fade">
+                                      <p:cBhvr>
+                                        <p:cTn id="15" dur="500"/>
+                                        <p:tgtEl>
+                                          <p:spTgt spid="3">
+                                            <p:txEl>
+                                              <p:pRg st="3" end="3"/>
+                                            </p:txEl>
+                                          </p:spTgt>
+                                        </p:tgtEl>
+                                      </p:cBhvr>
+                                    </p:animEffect>
+                                  </p:childTnLst>
+                                </p:cTn>
+                              </p:par>
+                            </p:childTnLst>
+                          </p:cTn>
+                        </p:par>
+                      </p:childTnLst>
+                    </p:cTn>
+                  </p:par>
+                  <p:par>
+                    <p:cTn id="16" fill="hold">
+                      <p:stCondLst>
+                        <p:cond delay="indefinite"/>
+                      </p:stCondLst>
+                      <p:childTnLst>
+                        <p:par>
+                          <p:cTn id="17" fill="hold">
+                            <p:stCondLst>
+                              <p:cond delay="0"/>
+                            </p:stCondLst>
+                            <p:childTnLst>
+                              <p:par>
+                                <p:cTn id="18" presetID="10" presetClass="entr" presetSubtype="0" fill="hold" nodeType="clickEffect">
+                                  <p:stCondLst>
+                                    <p:cond delay="0"/>
+                                  </p:stCondLst>
+                                  <p:childTnLst>
+                                    <p:set>
+                                      <p:cBhvr>
+                                        <p:cTn id="19" dur="1" fill="hold">
+                                          <p:stCondLst>
+                                            <p:cond delay="0"/>
+                                          </p:stCondLst>
+                                        </p:cTn>
+                                        <p:tgtEl>
+                                          <p:spTgt spid="3">
+                                            <p:txEl>
+                                              <p:pRg st="4" end="4"/>
+                                            </p:txEl>
+                                          </p:spTgt>
+                                        </p:tgtEl>
+                                        <p:attrNameLst>
+                                          <p:attrName>style.visibility</p:attrName>
+                                        </p:attrNameLst>
+                                      </p:cBhvr>
+                                      <p:to>
+                                        <p:strVal val="visible"/>
+                                      </p:to>
+                                    </p:set>
+                                    <p:animEffect transition="in" filter="fade">
+                                      <p:cBhvr>
+                                        <p:cTn id="20" dur="500"/>
+                                        <p:tgtEl>
+                                          <p:spTgt spid="3">
+                                            <p:txEl>
+                                              <p:pRg st="4" end="4"/>
+                                            </p:txEl>
+                                          </p:spTgt>
+                                        </p:tgtEl>
+                                      </p:cBhvr>
+                                    </p:animEffect>
+                                  </p:childTnLst>
+                                </p:cTn>
+                              </p:par>
+                            </p:childTnLst>
+                          </p:cTn>
+                        </p:par>
+                      </p:childTnLst>
+                    </p:cTn>
+                  </p:par>
+                  <p:par>
+                    <p:cTn id="21" fill="hold">
+                      <p:stCondLst>
+                        <p:cond delay="indefinite"/>
+                      </p:stCondLst>
+                      <p:childTnLst>
+                        <p:par>
+                          <p:cTn id="22" fill="hold">
+                            <p:stCondLst>
+                              <p:cond delay="0"/>
+                            </p:stCondLst>
+                            <p:childTnLst>
+                              <p:par>
+                                <p:cTn id="23" presetID="10" presetClass="entr" presetSubtype="0" fill="hold" nodeType="clickEffect">
+                                  <p:stCondLst>
+                                    <p:cond delay="0"/>
+                                  </p:stCondLst>
+                                  <p:childTnLst>
+                                    <p:set>
+                                      <p:cBhvr>
+                                        <p:cTn id="24" dur="1" fill="hold">
+                                          <p:stCondLst>
+                                            <p:cond delay="0"/>
+                                          </p:stCondLst>
+                                        </p:cTn>
+                                        <p:tgtEl>
+                                          <p:spTgt spid="3">
+                                            <p:txEl>
+                                              <p:pRg st="5" end="5"/>
+                                            </p:txEl>
+                                          </p:spTgt>
+                                        </p:tgtEl>
+                                        <p:attrNameLst>
+                                          <p:attrName>style.visibility</p:attrName>
+                                        </p:attrNameLst>
+                                      </p:cBhvr>
+                                      <p:to>
+                                        <p:strVal val="visible"/>
+                                      </p:to>
+                                    </p:set>
+                                    <p:animEffect transition="in" filter="fade">
+                                      <p:cBhvr>
+                                        <p:cTn id="25" dur="500"/>
+                                        <p:tgtEl>
+                                          <p:spTgt spid="3">
+                                            <p:txEl>
+                                              <p:pRg st="5" end="5"/>
+                                            </p:txEl>
+                                          </p:spTgt>
+                                        </p:tgtEl>
+                                      </p:cBhvr>
+                                    </p:animEffect>
+                                  </p:childTnLst>
+                                </p:cTn>
+                              </p:par>
+                            </p:childTnLst>
+                          </p:cTn>
+                        </p:par>
+                      </p:childTnLst>
+                    </p:cTn>
+                  </p:par>
+                </p:childTnLst>
+              </p:cTn>
+              <p:prevCondLst>
+                <p:cond evt="onPrev" delay="0">
+                  <p:tgtEl>
+                    <p:sldTgt/>
+                  </p:tgtEl>
+                </p:cond>
+              </p:prevCondLst>
+              <p:nextCondLst>
+                <p:cond evt="onNext" delay="0">
+                  <p:tgtEl>
+                    <p:sldTgt/>
+                  </p:tgtEl>
+                </p:cond>
+              </p:nextCondLst>
+            </p:seq>
+          </p:childTnLst>
+        </p:cTn>
+      </p:par>
+    </p:tnLst>
+  </p:timing>
 </p:sld>
 </file>
 

</xml_diff>